<commit_message>
Add final presentation ppt
</commit_message>
<xml_diff>
--- a/Final presentation.pptx
+++ b/Final presentation.pptx
@@ -13,9 +13,9 @@
     <p:sldId id="318" r:id="rId4"/>
     <p:sldId id="326" r:id="rId5"/>
     <p:sldId id="305" r:id="rId6"/>
-    <p:sldId id="317" r:id="rId7"/>
+    <p:sldId id="309" r:id="rId7"/>
     <p:sldId id="327" r:id="rId8"/>
-    <p:sldId id="309" r:id="rId9"/>
+    <p:sldId id="317" r:id="rId9"/>
     <p:sldId id="323" r:id="rId10"/>
     <p:sldId id="324" r:id="rId11"/>
     <p:sldId id="325" r:id="rId12"/>
@@ -6318,15 +6318,23 @@
             </a:r>
             <a:r>
               <a:rPr lang="ko-KR" altLang="en-US" dirty="0"/>
-              <a:t>변수 </a:t>
-            </a:r>
-            <a:r>
-              <a:rPr lang="ko-KR" altLang="en-US" dirty="0" err="1"/>
-              <a:t>명＇을</a:t>
+              <a:t>변수</a:t>
+            </a:r>
+            <a:r>
+              <a:rPr lang="en-US" altLang="ko-KR" dirty="0"/>
+              <a:t>/</a:t>
             </a:r>
             <a:r>
               <a:rPr lang="ko-KR" altLang="en-US" dirty="0"/>
-              <a:t> 잘 협의하여 사용하자</a:t>
+              <a:t>파일 명</a:t>
+            </a:r>
+            <a:r>
+              <a:rPr lang="en-US" altLang="ko-KR" dirty="0"/>
+              <a:t>’</a:t>
+            </a:r>
+            <a:r>
+              <a:rPr lang="ko-KR" altLang="en-US" dirty="0"/>
+              <a:t>을 잘 협의하여 사용하자</a:t>
             </a:r>
             <a:endParaRPr lang="en-US" altLang="ko-KR" dirty="0"/>
           </a:p>
@@ -6471,7 +6479,7 @@
         </p:blipFill>
         <p:spPr>
           <a:xfrm>
-            <a:off x="4888351" y="3021125"/>
+            <a:off x="5202676" y="3059225"/>
             <a:ext cx="6438900" cy="3171825"/>
           </a:xfrm>
           <a:prstGeom prst="rect">
@@ -6595,7 +6603,7 @@
           <a:p>
             <a:r>
               <a:rPr lang="en-US" altLang="ko-KR" dirty="0"/>
-              <a:t>‘Think what can we divide more work’</a:t>
+              <a:t>‘More division’</a:t>
             </a:r>
           </a:p>
           <a:p>
@@ -6735,6 +6743,115 @@
           </a:effectLst>
         </p:spPr>
       </p:pic>
+      <p:sp>
+        <p:nvSpPr>
+          <p:cNvPr id="5" name="직사각형 4">
+            <a:extLst>
+              <a:ext uri="{FF2B5EF4-FFF2-40B4-BE49-F238E27FC236}">
+                <a16:creationId xmlns:a16="http://schemas.microsoft.com/office/drawing/2014/main" id="{71D07C75-90DD-C664-9F05-983E70A311D0}"/>
+              </a:ext>
+            </a:extLst>
+          </p:cNvPr>
+          <p:cNvSpPr/>
+          <p:nvPr/>
+        </p:nvSpPr>
+        <p:spPr>
+          <a:xfrm>
+            <a:off x="8277225" y="3514725"/>
+            <a:ext cx="3076575" cy="685800"/>
+          </a:xfrm>
+          <a:prstGeom prst="rect">
+            <a:avLst/>
+          </a:prstGeom>
+          <a:solidFill>
+            <a:schemeClr val="bg1"/>
+          </a:solidFill>
+          <a:ln>
+            <a:solidFill>
+              <a:schemeClr val="tx1"/>
+            </a:solidFill>
+          </a:ln>
+        </p:spPr>
+        <p:style>
+          <a:lnRef idx="2">
+            <a:schemeClr val="accent1">
+              <a:shade val="50000"/>
+            </a:schemeClr>
+          </a:lnRef>
+          <a:fillRef idx="1">
+            <a:schemeClr val="accent1"/>
+          </a:fillRef>
+          <a:effectRef idx="0">
+            <a:schemeClr val="accent1"/>
+          </a:effectRef>
+          <a:fontRef idx="minor">
+            <a:schemeClr val="lt1"/>
+          </a:fontRef>
+        </p:style>
+        <p:txBody>
+          <a:bodyPr rtlCol="0" anchor="ctr"/>
+          <a:lstStyle/>
+          <a:p>
+            <a:pPr algn="ctr"/>
+            <a:r>
+              <a:rPr kumimoji="1" lang="en-US" altLang="ko-KR" sz="1400" dirty="0" err="1">
+                <a:solidFill>
+                  <a:schemeClr val="tx1"/>
+                </a:solidFill>
+              </a:rPr>
+              <a:t>Intellij</a:t>
+            </a:r>
+            <a:r>
+              <a:rPr kumimoji="1" lang="ko-KR" altLang="en-US" sz="1400" dirty="0">
+                <a:solidFill>
+                  <a:schemeClr val="tx1"/>
+                </a:solidFill>
+              </a:rPr>
+              <a:t>에서 </a:t>
+            </a:r>
+            <a:endParaRPr kumimoji="1" lang="en-US" altLang="ko-KR" sz="1400" dirty="0">
+              <a:solidFill>
+                <a:schemeClr val="tx1"/>
+              </a:solidFill>
+            </a:endParaRPr>
+          </a:p>
+          <a:p>
+            <a:pPr algn="ctr"/>
+            <a:r>
+              <a:rPr kumimoji="1" lang="en-US" altLang="ko-KR" sz="1400" dirty="0">
+                <a:solidFill>
+                  <a:schemeClr val="tx1"/>
+                </a:solidFill>
+              </a:rPr>
+              <a:t>VM </a:t>
+            </a:r>
+            <a:r>
+              <a:rPr kumimoji="1" lang="ko-KR" altLang="en-US" sz="1400" dirty="0">
+                <a:solidFill>
+                  <a:schemeClr val="tx1"/>
+                </a:solidFill>
+              </a:rPr>
+              <a:t>개발환경 세팅 방법을 </a:t>
+            </a:r>
+            <a:endParaRPr kumimoji="1" lang="en-US" altLang="ko-KR" sz="1400" dirty="0">
+              <a:solidFill>
+                <a:schemeClr val="tx1"/>
+              </a:solidFill>
+            </a:endParaRPr>
+          </a:p>
+          <a:p>
+            <a:pPr algn="ctr"/>
+            <a:r>
+              <a:rPr kumimoji="1" lang="ko-KR" altLang="en-US" sz="1400" dirty="0">
+                <a:solidFill>
+                  <a:schemeClr val="tx1"/>
+                </a:solidFill>
+              </a:rPr>
+              <a:t>정리한 문서</a:t>
+            </a:r>
+          </a:p>
+        </p:txBody>
+      </p:sp>
     </p:spTree>
     <p:extLst>
       <p:ext uri="{BB962C8B-B14F-4D97-AF65-F5344CB8AC3E}">
@@ -6962,7 +7079,7 @@
             <a:pPr lvl="1"/>
             <a:r>
               <a:rPr lang="en-US" altLang="ko-KR" dirty="0"/>
-              <a:t>Why? We have not much experience for Scala!</a:t>
+              <a:t>Why? We don’t have much experience for Scala!</a:t>
             </a:r>
           </a:p>
         </p:txBody>
@@ -7978,12 +8095,16 @@
               <a:t>의 역할로 </a:t>
             </a:r>
             <a:r>
-              <a:rPr lang="en-US" altLang="ko-KR" dirty="0" err="1"/>
-              <a:t>worke</a:t>
+              <a:rPr lang="en-US" altLang="ko-KR"/>
+              <a:t>worker</a:t>
+            </a:r>
+            <a:r>
+              <a:rPr lang="ko-KR" altLang="en-US"/>
+              <a:t>를 </a:t>
             </a:r>
             <a:r>
               <a:rPr lang="ko-KR" altLang="en-US" dirty="0"/>
-              <a:t>를 구현한 </a:t>
+              <a:t>구현한 </a:t>
             </a:r>
             <a:r>
               <a:rPr lang="en-US" altLang="ko-KR" dirty="0"/>
@@ -14113,12 +14234,12 @@
               <a:t>What I implemented - </a:t>
             </a:r>
             <a:r>
-              <a:rPr kumimoji="1" lang="ko-KR" altLang="en-US" dirty="0" err="1">
+              <a:rPr kumimoji="1" lang="ko-KR" altLang="en-US" dirty="0">
                 <a:solidFill>
                   <a:srgbClr val="7030A0"/>
                 </a:solidFill>
               </a:rPr>
-              <a:t>김은채</a:t>
+              <a:t>이창우</a:t>
             </a:r>
             <a:endParaRPr kumimoji="1" lang="ko-Kore-KR" altLang="en-US" dirty="0">
               <a:solidFill>
@@ -14196,155 +14317,123 @@
           </a:bodyPr>
           <a:lstStyle/>
           <a:p>
-            <a:pPr>
-              <a:buFont typeface="Arial" panose="020B0604020202020204" pitchFamily="34" charset="0"/>
-              <a:buChar char="•"/>
-            </a:pPr>
             <a:r>
               <a:rPr lang="en-US" altLang="ko-KR" dirty="0"/>
-              <a:t>VM </a:t>
-            </a:r>
+              <a:t>Sync between workers</a:t>
+            </a:r>
+          </a:p>
+          <a:p>
+            <a:pPr lvl="1"/>
+            <a:r>
+              <a:rPr lang="en-US" altLang="ko-KR" dirty="0"/>
+              <a:t>Using </a:t>
+            </a:r>
+            <a:r>
+              <a:rPr lang="en-US" altLang="ko-KR" dirty="0" err="1"/>
+              <a:t>CountDownLatch</a:t>
+            </a:r>
+            <a:endParaRPr lang="en-US" altLang="ko-KR" dirty="0"/>
+          </a:p>
+          <a:p>
+            <a:endParaRPr lang="en-US" altLang="ko-KR" dirty="0"/>
+          </a:p>
+          <a:p>
+            <a:r>
+              <a:rPr lang="en-US" altLang="ko-KR" dirty="0"/>
+              <a:t>Partitioning/Shuffling (Failed)</a:t>
+            </a:r>
+          </a:p>
+          <a:p>
+            <a:pPr lvl="1"/>
+            <a:r>
+              <a:rPr lang="en-US" altLang="ko-KR" dirty="0"/>
+              <a:t>‘labeling’ with tuple</a:t>
+            </a:r>
+          </a:p>
+          <a:p>
+            <a:pPr lvl="1"/>
+            <a:r>
+              <a:rPr lang="en-US" altLang="ko-KR" dirty="0"/>
+              <a:t>Grouping with zip </a:t>
+            </a:r>
+            <a:r>
+              <a:rPr lang="en-US" altLang="ko-KR" dirty="0" err="1"/>
+              <a:t>func</a:t>
+            </a:r>
+            <a:endParaRPr lang="en-US" altLang="ko-KR" dirty="0"/>
+          </a:p>
+          <a:p>
+            <a:pPr lvl="1"/>
+            <a:r>
+              <a:rPr lang="en-US" altLang="ko-KR" dirty="0"/>
+              <a:t>How to send Data between Worker??</a:t>
+            </a:r>
+          </a:p>
+          <a:p>
+            <a:pPr lvl="1"/>
+            <a:r>
+              <a:rPr lang="en-US" altLang="ko-KR" dirty="0"/>
+              <a:t>-&gt; Limit of </a:t>
+            </a:r>
+            <a:r>
+              <a:rPr lang="en-US" altLang="ko-KR" dirty="0" err="1"/>
+              <a:t>gRPC</a:t>
+            </a:r>
+            <a:r>
+              <a:rPr lang="en-US" altLang="ko-KR" dirty="0"/>
+              <a:t> (Not supposed to send large data)</a:t>
+            </a:r>
+          </a:p>
+          <a:p>
+            <a:pPr lvl="1"/>
+            <a:r>
+              <a:rPr lang="en-US" altLang="ko-KR" dirty="0"/>
+              <a:t>Socket connection? Java RMI?</a:t>
+            </a:r>
+          </a:p>
+          <a:p>
+            <a:pPr lvl="1"/>
+            <a:endParaRPr lang="en-US" altLang="ko-KR" dirty="0"/>
+          </a:p>
+          <a:p>
+            <a:r>
+              <a:rPr lang="en-US" altLang="ko-KR" dirty="0"/>
+              <a:t>Refactoring</a:t>
+            </a:r>
+          </a:p>
+          <a:p>
+            <a:pPr lvl="1"/>
             <a:r>
               <a:rPr lang="ko-KR" altLang="en-US" dirty="0"/>
-              <a:t>테스트 환경 구축 및 테스트</a:t>
+              <a:t>변수 명 고치기</a:t>
             </a:r>
             <a:endParaRPr lang="en-US" altLang="ko-KR" dirty="0"/>
           </a:p>
           <a:p>
-            <a:pPr>
-              <a:buFont typeface="Arial" panose="020B0604020202020204" pitchFamily="34" charset="0"/>
-              <a:buChar char="•"/>
-            </a:pPr>
-            <a:endParaRPr lang="ko-KR" altLang="en-US" dirty="0"/>
-          </a:p>
-          <a:p>
-            <a:pPr>
-              <a:buFont typeface="Arial" panose="020B0604020202020204" pitchFamily="34" charset="0"/>
-              <a:buChar char="•"/>
-            </a:pPr>
+            <a:pPr lvl="1"/>
+            <a:r>
+              <a:rPr lang="en-US" altLang="ko-KR" dirty="0"/>
+              <a:t>Parameter</a:t>
+            </a:r>
             <a:r>
               <a:rPr lang="ko-KR" altLang="en-US" dirty="0"/>
-              <a:t>명령어 실행 과정</a:t>
-            </a:r>
-            <a:r>
-              <a:rPr lang="en-US" altLang="ko-KR" dirty="0"/>
-              <a:t>(argument parsing)</a:t>
-            </a:r>
-          </a:p>
-          <a:p>
-            <a:pPr lvl="1">
-              <a:buFont typeface="Arial" panose="020B0604020202020204" pitchFamily="34" charset="0"/>
-              <a:buChar char="•"/>
-            </a:pPr>
-            <a:r>
-              <a:rPr lang="en-US" altLang="ko-KR" dirty="0"/>
-              <a:t>Object</a:t>
-            </a:r>
-            <a:r>
-              <a:rPr lang="ko-KR" altLang="en-US" dirty="0"/>
-              <a:t> </a:t>
-            </a:r>
-            <a:r>
-              <a:rPr lang="en-US" altLang="ko-KR" dirty="0" err="1"/>
-              <a:t>entryPoint</a:t>
-            </a:r>
-            <a:r>
-              <a:rPr lang="en-US" altLang="ko-KR" dirty="0"/>
-              <a:t>: argument list</a:t>
-            </a:r>
-            <a:r>
-              <a:rPr lang="ko-KR" altLang="en-US" dirty="0"/>
-              <a:t>의 길이에 따라 </a:t>
-            </a:r>
-            <a:r>
-              <a:rPr lang="en-US" altLang="ko-KR" dirty="0" err="1"/>
-              <a:t>argumen</a:t>
-            </a:r>
-            <a:r>
-              <a:rPr lang="ko-KR" altLang="en-US" dirty="0"/>
-              <a:t>를 파싱하고 </a:t>
-            </a:r>
-            <a:r>
-              <a:rPr lang="en-US" altLang="ko-KR" dirty="0"/>
-              <a:t>worker/master </a:t>
-            </a:r>
-            <a:r>
-              <a:rPr lang="ko-KR" altLang="en-US" dirty="0"/>
-              <a:t>생성</a:t>
-            </a:r>
-            <a:r>
-              <a:rPr lang="en-US" altLang="ko-KR" dirty="0"/>
-              <a:t>, start</a:t>
-            </a:r>
-          </a:p>
-          <a:p>
-            <a:pPr lvl="1">
-              <a:buFont typeface="Arial" panose="020B0604020202020204" pitchFamily="34" charset="0"/>
-              <a:buChar char="•"/>
-            </a:pPr>
-            <a:r>
-              <a:rPr lang="en-US" altLang="ko-KR" dirty="0"/>
-              <a:t>Object Parser</a:t>
-            </a:r>
-          </a:p>
-          <a:p>
-            <a:pPr marL="139700" indent="0">
-              <a:buNone/>
-            </a:pPr>
-            <a:endParaRPr lang="ko-KR" altLang="en-US" dirty="0"/>
-          </a:p>
-          <a:p>
-            <a:pPr>
-              <a:buFont typeface="Arial" panose="020B0604020202020204" pitchFamily="34" charset="0"/>
-              <a:buChar char="•"/>
-            </a:pPr>
-            <a:r>
-              <a:rPr lang="ko-KR" altLang="en-US" dirty="0"/>
-              <a:t>개발 및 디버깅 도움</a:t>
+              <a:t>가 적절하게 설정되었는지 확인</a:t>
             </a:r>
             <a:endParaRPr lang="en-US" altLang="ko-KR" dirty="0"/>
           </a:p>
           <a:p>
-            <a:pPr lvl="1">
-              <a:buFont typeface="Arial" panose="020B0604020202020204" pitchFamily="34" charset="0"/>
-              <a:buChar char="•"/>
-            </a:pPr>
-            <a:r>
-              <a:rPr lang="en-US" altLang="ko-KR" dirty="0"/>
-              <a:t>Proto to Object</a:t>
-            </a:r>
-          </a:p>
-          <a:p>
-            <a:pPr lvl="1">
-              <a:buFont typeface="Arial" panose="020B0604020202020204" pitchFamily="34" charset="0"/>
-              <a:buChar char="•"/>
-            </a:pPr>
+            <a:pPr lvl="1"/>
             <a:endParaRPr lang="en-US" altLang="ko-KR" dirty="0"/>
           </a:p>
           <a:p>
-            <a:pPr>
-              <a:buFont typeface="Arial" panose="020B0604020202020204" pitchFamily="34" charset="0"/>
-              <a:buChar char="•"/>
-            </a:pPr>
-            <a:r>
-              <a:rPr lang="en-US" altLang="ko-KR" dirty="0"/>
-              <a:t>README</a:t>
-            </a:r>
-            <a:r>
-              <a:rPr lang="ko-KR" altLang="en-US" dirty="0"/>
-              <a:t> 작성</a:t>
-            </a:r>
-            <a:r>
-              <a:rPr lang="en-US" altLang="ko-KR" dirty="0"/>
-              <a:t>	</a:t>
-            </a:r>
+            <a:endParaRPr lang="en-US" altLang="ko-KR" dirty="0"/>
           </a:p>
         </p:txBody>
       </p:sp>
     </p:spTree>
     <p:extLst>
       <p:ext uri="{BB962C8B-B14F-4D97-AF65-F5344CB8AC3E}">
-        <p14:creationId xmlns:p14="http://schemas.microsoft.com/office/powerpoint/2010/main" val="2244407934"/>
+        <p14:creationId xmlns:p14="http://schemas.microsoft.com/office/powerpoint/2010/main" val="1154586773"/>
       </p:ext>
     </p:extLst>
   </p:cSld>
@@ -14628,12 +14717,12 @@
               <a:t>What I implemented - </a:t>
             </a:r>
             <a:r>
-              <a:rPr kumimoji="1" lang="ko-KR" altLang="en-US" dirty="0">
+              <a:rPr kumimoji="1" lang="ko-KR" altLang="en-US" dirty="0" err="1">
                 <a:solidFill>
                   <a:srgbClr val="7030A0"/>
                 </a:solidFill>
               </a:rPr>
-              <a:t>이창우</a:t>
+              <a:t>김은채</a:t>
             </a:r>
             <a:endParaRPr kumimoji="1" lang="ko-Kore-KR" altLang="en-US" dirty="0">
               <a:solidFill>
@@ -14711,123 +14800,165 @@
           </a:bodyPr>
           <a:lstStyle/>
           <a:p>
+            <a:pPr>
+              <a:buFont typeface="Arial" panose="020B0604020202020204" pitchFamily="34" charset="0"/>
+              <a:buChar char="•"/>
+            </a:pPr>
             <a:r>
               <a:rPr lang="en-US" altLang="ko-KR" dirty="0"/>
-              <a:t>Sync between workers</a:t>
-            </a:r>
-          </a:p>
-          <a:p>
-            <a:pPr lvl="1"/>
+              <a:t>VM </a:t>
+            </a:r>
+            <a:r>
+              <a:rPr lang="ko-KR" altLang="en-US" dirty="0"/>
+              <a:t>테스트 환경 구축 및 테스트</a:t>
+            </a:r>
+            <a:endParaRPr lang="en-US" altLang="ko-KR" dirty="0"/>
+          </a:p>
+          <a:p>
+            <a:pPr lvl="1">
+              <a:buFont typeface="Arial" panose="020B0604020202020204" pitchFamily="34" charset="0"/>
+              <a:buChar char="•"/>
+            </a:pPr>
             <a:r>
               <a:rPr lang="en-US" altLang="ko-KR" dirty="0"/>
-              <a:t>Using </a:t>
+              <a:t>Putty, git</a:t>
+            </a:r>
+          </a:p>
+          <a:p>
+            <a:pPr>
+              <a:buFont typeface="Arial" panose="020B0604020202020204" pitchFamily="34" charset="0"/>
+              <a:buChar char="•"/>
+            </a:pPr>
+            <a:endParaRPr lang="ko-KR" altLang="en-US" dirty="0"/>
+          </a:p>
+          <a:p>
+            <a:pPr>
+              <a:buFont typeface="Arial" panose="020B0604020202020204" pitchFamily="34" charset="0"/>
+              <a:buChar char="•"/>
+            </a:pPr>
+            <a:r>
+              <a:rPr lang="ko-KR" altLang="en-US" dirty="0"/>
+              <a:t>명령어 실행 과정</a:t>
+            </a:r>
+            <a:r>
+              <a:rPr lang="en-US" altLang="ko-KR" dirty="0"/>
+              <a:t>(argument parsing)</a:t>
+            </a:r>
+          </a:p>
+          <a:p>
+            <a:pPr lvl="1">
+              <a:buFont typeface="Arial" panose="020B0604020202020204" pitchFamily="34" charset="0"/>
+              <a:buChar char="•"/>
+            </a:pPr>
+            <a:r>
+              <a:rPr lang="en-US" altLang="ko-KR" dirty="0"/>
+              <a:t>Object</a:t>
+            </a:r>
+            <a:r>
+              <a:rPr lang="ko-KR" altLang="en-US" dirty="0"/>
+              <a:t> </a:t>
             </a:r>
             <a:r>
               <a:rPr lang="en-US" altLang="ko-KR" dirty="0" err="1"/>
-              <a:t>CountDownLatch</a:t>
+              <a:t>entryPoint</a:t>
+            </a:r>
+            <a:r>
+              <a:rPr lang="en-US" altLang="ko-KR" dirty="0"/>
+              <a:t>: argument list</a:t>
+            </a:r>
+            <a:r>
+              <a:rPr lang="ko-KR" altLang="en-US" dirty="0"/>
+              <a:t>의 길이에 따라 </a:t>
+            </a:r>
+            <a:r>
+              <a:rPr lang="en-US" altLang="ko-KR" dirty="0"/>
+              <a:t>argument</a:t>
+            </a:r>
+            <a:r>
+              <a:rPr lang="ko-KR" altLang="en-US" dirty="0"/>
+              <a:t>를 파싱하고 </a:t>
+            </a:r>
+            <a:r>
+              <a:rPr lang="en-US" altLang="ko-KR" dirty="0"/>
+              <a:t>worker/master server </a:t>
+            </a:r>
+            <a:r>
+              <a:rPr lang="ko-KR" altLang="en-US" dirty="0"/>
+              <a:t>생성</a:t>
+            </a:r>
+            <a:r>
+              <a:rPr lang="en-US" altLang="ko-KR" dirty="0"/>
+              <a:t>, start</a:t>
+            </a:r>
+          </a:p>
+          <a:p>
+            <a:pPr lvl="1">
+              <a:buFont typeface="Arial" panose="020B0604020202020204" pitchFamily="34" charset="0"/>
+              <a:buChar char="•"/>
+            </a:pPr>
+            <a:r>
+              <a:rPr lang="en-US" altLang="ko-KR" dirty="0"/>
+              <a:t>Object Parser</a:t>
+            </a:r>
+          </a:p>
+          <a:p>
+            <a:pPr marL="139700" indent="0">
+              <a:buNone/>
+            </a:pPr>
+            <a:endParaRPr lang="ko-KR" altLang="en-US" dirty="0"/>
+          </a:p>
+          <a:p>
+            <a:pPr>
+              <a:buFont typeface="Arial" panose="020B0604020202020204" pitchFamily="34" charset="0"/>
+              <a:buChar char="•"/>
+            </a:pPr>
+            <a:r>
+              <a:rPr lang="ko-KR" altLang="en-US" dirty="0"/>
+              <a:t>개발 및 디버깅 도움</a:t>
             </a:r>
             <a:endParaRPr lang="en-US" altLang="ko-KR" dirty="0"/>
           </a:p>
           <a:p>
+            <a:pPr lvl="1">
+              <a:buFont typeface="Arial" panose="020B0604020202020204" pitchFamily="34" charset="0"/>
+              <a:buChar char="•"/>
+            </a:pPr>
+            <a:r>
+              <a:rPr lang="en-US" altLang="ko-KR" dirty="0"/>
+              <a:t>Proto to Object</a:t>
+            </a:r>
+          </a:p>
+          <a:p>
+            <a:pPr lvl="1">
+              <a:buFont typeface="Arial" panose="020B0604020202020204" pitchFamily="34" charset="0"/>
+              <a:buChar char="•"/>
+            </a:pPr>
             <a:endParaRPr lang="en-US" altLang="ko-KR" dirty="0"/>
           </a:p>
           <a:p>
+            <a:pPr>
+              <a:buFont typeface="Arial" panose="020B0604020202020204" pitchFamily="34" charset="0"/>
+              <a:buChar char="•"/>
+            </a:pPr>
             <a:r>
               <a:rPr lang="en-US" altLang="ko-KR" dirty="0"/>
-              <a:t>Partitioning/Shuffling (Failed)</a:t>
-            </a:r>
-          </a:p>
-          <a:p>
-            <a:pPr lvl="1"/>
+              <a:t>README</a:t>
+            </a:r>
+            <a:r>
+              <a:rPr lang="ko-KR" altLang="en-US" dirty="0"/>
+              <a:t> 작성</a:t>
+            </a:r>
             <a:r>
               <a:rPr lang="en-US" altLang="ko-KR" dirty="0"/>
-              <a:t>‘labeling’ with tuple</a:t>
-            </a:r>
-          </a:p>
-          <a:p>
-            <a:pPr lvl="1"/>
-            <a:r>
-              <a:rPr lang="en-US" altLang="ko-KR" dirty="0"/>
-              <a:t>Grouping with zip </a:t>
-            </a:r>
-            <a:r>
-              <a:rPr lang="en-US" altLang="ko-KR" dirty="0" err="1"/>
-              <a:t>func</a:t>
-            </a:r>
-            <a:endParaRPr lang="en-US" altLang="ko-KR" dirty="0"/>
-          </a:p>
-          <a:p>
-            <a:pPr lvl="1"/>
-            <a:r>
-              <a:rPr lang="en-US" altLang="ko-KR" dirty="0"/>
-              <a:t>How to send Data between Worker??</a:t>
-            </a:r>
-          </a:p>
-          <a:p>
-            <a:pPr lvl="1"/>
-            <a:r>
-              <a:rPr lang="en-US" altLang="ko-KR" dirty="0"/>
-              <a:t>-&gt; Limit of </a:t>
-            </a:r>
-            <a:r>
-              <a:rPr lang="en-US" altLang="ko-KR" dirty="0" err="1"/>
-              <a:t>gRPC</a:t>
-            </a:r>
-            <a:r>
-              <a:rPr lang="en-US" altLang="ko-KR" dirty="0"/>
-              <a:t> (Not supposed to send large data)</a:t>
-            </a:r>
-          </a:p>
-          <a:p>
-            <a:pPr lvl="1"/>
-            <a:r>
-              <a:rPr lang="en-US" altLang="ko-KR" dirty="0"/>
-              <a:t>Socket connection? Java RMI?</a:t>
-            </a:r>
-          </a:p>
-          <a:p>
-            <a:pPr lvl="1"/>
-            <a:endParaRPr lang="en-US" altLang="ko-KR" dirty="0"/>
-          </a:p>
-          <a:p>
-            <a:r>
-              <a:rPr lang="en-US" altLang="ko-KR" dirty="0"/>
-              <a:t>Refactoring</a:t>
-            </a:r>
-          </a:p>
-          <a:p>
-            <a:pPr lvl="1"/>
-            <a:r>
-              <a:rPr lang="ko-KR" altLang="en-US" dirty="0"/>
-              <a:t>변수 명 고치기</a:t>
-            </a:r>
-            <a:endParaRPr lang="en-US" altLang="ko-KR" dirty="0"/>
-          </a:p>
-          <a:p>
-            <a:pPr lvl="1"/>
-            <a:r>
-              <a:rPr lang="en-US" altLang="ko-KR" dirty="0"/>
-              <a:t>Parameter</a:t>
-            </a:r>
-            <a:r>
-              <a:rPr lang="ko-KR" altLang="en-US" dirty="0"/>
-              <a:t>가 적절하게 설정되었는지 확인</a:t>
-            </a:r>
-            <a:endParaRPr lang="en-US" altLang="ko-KR" dirty="0"/>
-          </a:p>
-          <a:p>
-            <a:pPr lvl="1"/>
-            <a:endParaRPr lang="en-US" altLang="ko-KR" dirty="0"/>
-          </a:p>
-          <a:p>
-            <a:endParaRPr lang="en-US" altLang="ko-KR" dirty="0"/>
+              <a:t>	</a:t>
+            </a:r>
           </a:p>
         </p:txBody>
       </p:sp>
     </p:spTree>
     <p:extLst>
       <p:ext uri="{BB962C8B-B14F-4D97-AF65-F5344CB8AC3E}">
-        <p14:creationId xmlns:p14="http://schemas.microsoft.com/office/powerpoint/2010/main" val="1154586773"/>
+        <p14:creationId xmlns:p14="http://schemas.microsoft.com/office/powerpoint/2010/main" val="2244407934"/>
       </p:ext>
     </p:extLst>
   </p:cSld>

</xml_diff>